<commit_message>
[Slide] Update coding convention
</commit_message>
<xml_diff>
--- a/Common/Reports/Report 2.pptx
+++ b/Common/Reports/Report 2.pptx
@@ -5,7 +5,7 @@
     <p:sldMasterId id="2147483648" r:id="rId1"/>
   </p:sldMasterIdLst>
   <p:notesMasterIdLst>
-    <p:notesMasterId r:id="rId20"/>
+    <p:notesMasterId r:id="rId22"/>
   </p:notesMasterIdLst>
   <p:sldIdLst>
     <p:sldId id="758" r:id="rId2"/>
@@ -26,6 +26,8 @@
     <p:sldId id="971" r:id="rId17"/>
     <p:sldId id="972" r:id="rId18"/>
     <p:sldId id="973" r:id="rId19"/>
+    <p:sldId id="978" r:id="rId20"/>
+    <p:sldId id="979" r:id="rId21"/>
   </p:sldIdLst>
   <p:sldSz cx="24377650" cy="13716000"/>
   <p:notesSz cx="6858000" cy="9144000"/>
@@ -273,7 +275,7 @@
             <a:fld id="{EFC10EE1-B198-C942-8235-326C972CBB30}" type="datetimeFigureOut">
               <a:rPr lang="en-US" smtClean="0"/>
               <a:pPr/>
-              <a:t>01/17/2017</a:t>
+              <a:t>01/19/2017</a:t>
             </a:fld>
             <a:endParaRPr lang="en-US" dirty="0"/>
           </a:p>
@@ -2557,17 +2559,7 @@
                   <a:latin typeface="Lato Black"/>
                   <a:cs typeface="Lato Black"/>
                 </a:rPr>
-                <a:t>Report </a:t>
-              </a:r>
-              <a:r>
-                <a:rPr lang="en-US" sz="13800" dirty="0" smtClean="0">
-                  <a:solidFill>
-                    <a:schemeClr val="tx1"/>
-                  </a:solidFill>
-                  <a:latin typeface="Lato Black"/>
-                  <a:cs typeface="Lato Black"/>
-                </a:rPr>
-                <a:t>2</a:t>
+                <a:t>Report 2</a:t>
               </a:r>
               <a:endParaRPr lang="en-US" sz="13800" dirty="0" smtClean="0">
                 <a:solidFill>
@@ -3153,11 +3145,11 @@
   <p:clrMapOvr>
     <a:masterClrMapping/>
   </p:clrMapOvr>
-  <mc:AlternateContent xmlns:mc="http://schemas.openxmlformats.org/markup-compatibility/2006">
-    <mc:Choice xmlns:p14="http://schemas.microsoft.com/office/powerpoint/2010/main" Requires="p14">
+  <mc:AlternateContent xmlns:mc="http://schemas.openxmlformats.org/markup-compatibility/2006" xmlns:p14="http://schemas.microsoft.com/office/powerpoint/2010/main">
+    <mc:Choice Requires="p14">
       <p:transition p14:dur="0"/>
     </mc:Choice>
-    <mc:Fallback>
+    <mc:Fallback xmlns="">
       <p:transition/>
     </mc:Fallback>
   </mc:AlternateContent>
@@ -4257,11 +4249,11 @@
   <p:clrMapOvr>
     <a:masterClrMapping/>
   </p:clrMapOvr>
-  <mc:AlternateContent xmlns:mc="http://schemas.openxmlformats.org/markup-compatibility/2006">
-    <mc:Choice xmlns:p14="http://schemas.microsoft.com/office/powerpoint/2010/main" Requires="p14">
+  <mc:AlternateContent xmlns:mc="http://schemas.openxmlformats.org/markup-compatibility/2006" xmlns:p14="http://schemas.microsoft.com/office/powerpoint/2010/main">
+    <mc:Choice Requires="p14">
       <p:transition p14:dur="0"/>
     </mc:Choice>
-    <mc:Fallback>
+    <mc:Fallback xmlns="">
       <p:transition/>
     </mc:Fallback>
   </mc:AlternateContent>
@@ -5637,11 +5629,11 @@
   <p:clrMapOvr>
     <a:masterClrMapping/>
   </p:clrMapOvr>
-  <mc:AlternateContent xmlns:mc="http://schemas.openxmlformats.org/markup-compatibility/2006">
-    <mc:Choice xmlns:p14="http://schemas.microsoft.com/office/powerpoint/2010/main" Requires="p14">
+  <mc:AlternateContent xmlns:mc="http://schemas.openxmlformats.org/markup-compatibility/2006" xmlns:p14="http://schemas.microsoft.com/office/powerpoint/2010/main">
+    <mc:Choice Requires="p14">
       <p:transition p14:dur="0"/>
     </mc:Choice>
-    <mc:Fallback>
+    <mc:Fallback xmlns="">
       <p:transition/>
     </mc:Fallback>
   </mc:AlternateContent>
@@ -5770,11 +5762,11 @@
   <p:clrMapOvr>
     <a:masterClrMapping/>
   </p:clrMapOvr>
-  <mc:AlternateContent xmlns:mc="http://schemas.openxmlformats.org/markup-compatibility/2006">
-    <mc:Choice xmlns:p14="http://schemas.microsoft.com/office/powerpoint/2010/main" Requires="p14">
+  <mc:AlternateContent xmlns:mc="http://schemas.openxmlformats.org/markup-compatibility/2006" xmlns:p14="http://schemas.microsoft.com/office/powerpoint/2010/main">
+    <mc:Choice Requires="p14">
       <p:transition p14:dur="0"/>
     </mc:Choice>
-    <mc:Fallback>
+    <mc:Fallback xmlns="">
       <p:transition/>
     </mc:Fallback>
   </mc:AlternateContent>
@@ -6755,11 +6747,11 @@
   <p:clrMapOvr>
     <a:masterClrMapping/>
   </p:clrMapOvr>
-  <mc:AlternateContent xmlns:mc="http://schemas.openxmlformats.org/markup-compatibility/2006">
-    <mc:Choice xmlns:p14="http://schemas.microsoft.com/office/powerpoint/2010/main" Requires="p14">
+  <mc:AlternateContent xmlns:mc="http://schemas.openxmlformats.org/markup-compatibility/2006" xmlns:p14="http://schemas.microsoft.com/office/powerpoint/2010/main">
+    <mc:Choice Requires="p14">
       <p:transition p14:dur="0"/>
     </mc:Choice>
-    <mc:Fallback>
+    <mc:Fallback xmlns="">
       <p:transition/>
     </mc:Fallback>
   </mc:AlternateContent>
@@ -8470,11 +8462,11 @@
   <p:clrMapOvr>
     <a:masterClrMapping/>
   </p:clrMapOvr>
-  <mc:AlternateContent xmlns:mc="http://schemas.openxmlformats.org/markup-compatibility/2006">
-    <mc:Choice xmlns:p14="http://schemas.microsoft.com/office/powerpoint/2010/main" Requires="p14">
+  <mc:AlternateContent xmlns:mc="http://schemas.openxmlformats.org/markup-compatibility/2006" xmlns:p14="http://schemas.microsoft.com/office/powerpoint/2010/main">
+    <mc:Choice Requires="p14">
       <p:transition p14:dur="0"/>
     </mc:Choice>
-    <mc:Fallback>
+    <mc:Fallback xmlns="">
       <p:transition/>
     </mc:Fallback>
   </mc:AlternateContent>
@@ -8603,11 +8595,11 @@
   <p:clrMapOvr>
     <a:masterClrMapping/>
   </p:clrMapOvr>
-  <mc:AlternateContent xmlns:mc="http://schemas.openxmlformats.org/markup-compatibility/2006">
-    <mc:Choice xmlns:p14="http://schemas.microsoft.com/office/powerpoint/2010/main" Requires="p14">
+  <mc:AlternateContent xmlns:mc="http://schemas.openxmlformats.org/markup-compatibility/2006" xmlns:p14="http://schemas.microsoft.com/office/powerpoint/2010/main">
+    <mc:Choice Requires="p14">
       <p:transition p14:dur="0"/>
     </mc:Choice>
-    <mc:Fallback>
+    <mc:Fallback xmlns="">
       <p:transition/>
     </mc:Fallback>
   </mc:AlternateContent>
@@ -8988,11 +8980,11 @@
   <p:clrMapOvr>
     <a:masterClrMapping/>
   </p:clrMapOvr>
-  <mc:AlternateContent xmlns:mc="http://schemas.openxmlformats.org/markup-compatibility/2006">
-    <mc:Choice xmlns:p14="http://schemas.microsoft.com/office/powerpoint/2010/main" Requires="p14">
+  <mc:AlternateContent xmlns:mc="http://schemas.openxmlformats.org/markup-compatibility/2006" xmlns:p14="http://schemas.microsoft.com/office/powerpoint/2010/main">
+    <mc:Choice Requires="p14">
       <p:transition p14:dur="0"/>
     </mc:Choice>
-    <mc:Fallback>
+    <mc:Fallback xmlns="">
       <p:transition/>
     </mc:Fallback>
   </mc:AlternateContent>
@@ -9146,7 +9138,7 @@
               </a:tabLst>
             </a:pPr>
             <a:r>
-              <a:rPr lang="en-US" sz="5400" dirty="0">
+              <a:rPr lang="en-US" sz="5400" dirty="0" smtClean="0">
                 <a:solidFill>
                   <a:schemeClr val="tx1"/>
                 </a:solidFill>
@@ -9155,13 +9147,22 @@
               <a:t>C</a:t>
             </a:r>
             <a:r>
+              <a:rPr lang="en-US" sz="5400" dirty="0">
+                <a:solidFill>
+                  <a:schemeClr val="tx1"/>
+                </a:solidFill>
+                <a:cs typeface="Lato Light"/>
+              </a:rPr>
+              <a:t>#, </a:t>
+            </a:r>
+            <a:r>
               <a:rPr lang="en-US" sz="5400" dirty="0" smtClean="0">
                 <a:solidFill>
                   <a:schemeClr val="tx1"/>
                 </a:solidFill>
                 <a:cs typeface="Lato Light"/>
               </a:rPr>
-              <a:t>#</a:t>
+              <a:t>ASP.NET</a:t>
             </a:r>
             <a:endParaRPr lang="en-US" sz="5400" dirty="0" smtClean="0">
               <a:solidFill>
@@ -9198,6 +9199,189 @@
       </p:par>
     </p:tnLst>
   </p:timing>
+</p:sld>
+</file>
+
+<file path=ppt/slides/slide19.xml><?xml version="1.0" encoding="utf-8"?>
+<p:sld xmlns:a="http://schemas.openxmlformats.org/drawingml/2006/main" xmlns:r="http://schemas.openxmlformats.org/officeDocument/2006/relationships" xmlns:p="http://schemas.openxmlformats.org/presentationml/2006/main">
+  <p:cSld>
+    <p:spTree>
+      <p:nvGrpSpPr>
+        <p:cNvPr id="1" name=""/>
+        <p:cNvGrpSpPr/>
+        <p:nvPr/>
+      </p:nvGrpSpPr>
+      <p:grpSpPr>
+        <a:xfrm>
+          <a:off x="0" y="0"/>
+          <a:ext cx="0" cy="0"/>
+          <a:chOff x="0" y="0"/>
+          <a:chExt cx="0" cy="0"/>
+        </a:xfrm>
+      </p:grpSpPr>
+      <p:sp>
+        <p:nvSpPr>
+          <p:cNvPr id="3" name="Rectangle 2"/>
+          <p:cNvSpPr/>
+          <p:nvPr/>
+        </p:nvSpPr>
+        <p:spPr>
+          <a:xfrm>
+            <a:off x="7455506" y="756102"/>
+            <a:ext cx="10100974" cy="1077176"/>
+          </a:xfrm>
+          <a:prstGeom prst="rect">
+            <a:avLst/>
+          </a:prstGeom>
+          <a:noFill/>
+          <a:ln w="6350" cmpd="sng">
+            <a:noFill/>
+          </a:ln>
+          <a:effectLst/>
+        </p:spPr>
+        <p:style>
+          <a:lnRef idx="1">
+            <a:schemeClr val="accent1"/>
+          </a:lnRef>
+          <a:fillRef idx="3">
+            <a:schemeClr val="accent1"/>
+          </a:fillRef>
+          <a:effectRef idx="2">
+            <a:schemeClr val="accent1"/>
+          </a:effectRef>
+          <a:fontRef idx="minor">
+            <a:schemeClr val="lt1"/>
+          </a:fontRef>
+        </p:style>
+        <p:txBody>
+          <a:bodyPr wrap="square" lIns="243797" tIns="121899" rIns="243797" bIns="121899" rtlCol="0" anchor="ctr">
+            <a:spAutoFit/>
+          </a:bodyPr>
+          <a:lstStyle/>
+          <a:p>
+            <a:pPr algn="ctr">
+              <a:tabLst>
+                <a:tab pos="338138" algn="l"/>
+              </a:tabLst>
+            </a:pPr>
+            <a:r>
+              <a:rPr lang="en-US" sz="5400" dirty="0" smtClean="0">
+                <a:solidFill>
+                  <a:schemeClr val="tx1"/>
+                </a:solidFill>
+                <a:cs typeface="Lato Light"/>
+              </a:rPr>
+              <a:t>Python </a:t>
+            </a:r>
+            <a:endParaRPr lang="en-US" sz="5400" dirty="0" smtClean="0">
+              <a:solidFill>
+                <a:schemeClr val="tx1"/>
+              </a:solidFill>
+              <a:latin typeface="Lato Light"/>
+              <a:cs typeface="Lato Light"/>
+            </a:endParaRPr>
+          </a:p>
+        </p:txBody>
+      </p:sp>
+      <p:sp>
+        <p:nvSpPr>
+          <p:cNvPr id="5" name="Rectangle 4"/>
+          <p:cNvSpPr/>
+          <p:nvPr/>
+        </p:nvSpPr>
+        <p:spPr>
+          <a:xfrm>
+            <a:off x="3762103" y="3004457"/>
+            <a:ext cx="19359155" cy="5078313"/>
+          </a:xfrm>
+          <a:prstGeom prst="rect">
+            <a:avLst/>
+          </a:prstGeom>
+        </p:spPr>
+        <p:txBody>
+          <a:bodyPr wrap="square">
+            <a:spAutoFit/>
+          </a:bodyPr>
+          <a:lstStyle/>
+          <a:p>
+            <a:r>
+              <a:rPr lang="en-US" dirty="0"/>
+              <a:t>Using to develop program on Raspberry Pi</a:t>
+            </a:r>
+          </a:p>
+          <a:p>
+            <a:r>
+              <a:rPr lang="en-US" dirty="0"/>
+              <a:t>Summary:</a:t>
+            </a:r>
+          </a:p>
+          <a:p>
+            <a:pPr lvl="0"/>
+            <a:r>
+              <a:rPr lang="en-US" dirty="0"/>
+              <a:t>Naming Convention:</a:t>
+            </a:r>
+          </a:p>
+          <a:p>
+            <a:pPr lvl="1"/>
+            <a:r>
+              <a:rPr lang="en-US" dirty="0"/>
+              <a:t>"Internal" means internal to a module or protected or private within a class.</a:t>
+            </a:r>
+          </a:p>
+          <a:p>
+            <a:pPr lvl="1"/>
+            <a:r>
+              <a:rPr lang="en-US" dirty="0" smtClean="0"/>
+              <a:t>Place </a:t>
+            </a:r>
+            <a:r>
+              <a:rPr lang="en-US" dirty="0"/>
+              <a:t>related classes and top-level functions together in a module. Unlike Java, there is no need to limit yourself to one class per module.</a:t>
+            </a:r>
+          </a:p>
+          <a:p>
+            <a:pPr lvl="1"/>
+            <a:r>
+              <a:rPr lang="en-US" dirty="0"/>
+              <a:t>Use Pascal Case for class names, but lower_with_under.py for module names. </a:t>
+            </a:r>
+          </a:p>
+          <a:p>
+            <a:r>
+              <a:rPr lang="en-US" dirty="0"/>
+              <a:t>More detail about code conventions for Python by Google:</a:t>
+            </a:r>
+          </a:p>
+          <a:p>
+            <a:r>
+              <a:rPr lang="en-US" u="sng" dirty="0">
+                <a:hlinkClick r:id="rId2"/>
+              </a:rPr>
+              <a:t>https://google.github.io/styleguide/pyguide.html</a:t>
+            </a:r>
+            <a:endParaRPr lang="en-US" dirty="0"/>
+          </a:p>
+        </p:txBody>
+      </p:sp>
+    </p:spTree>
+    <p:extLst>
+      <p:ext uri="{BB962C8B-B14F-4D97-AF65-F5344CB8AC3E}">
+        <p14:creationId xmlns:p14="http://schemas.microsoft.com/office/powerpoint/2010/main" val="3181964475"/>
+      </p:ext>
+    </p:extLst>
+  </p:cSld>
+  <p:clrMapOvr>
+    <a:masterClrMapping/>
+  </p:clrMapOvr>
+  <mc:AlternateContent xmlns:mc="http://schemas.openxmlformats.org/markup-compatibility/2006">
+    <mc:Choice xmlns:p14="http://schemas.microsoft.com/office/powerpoint/2010/main" Requires="p14">
+      <p:transition p14:dur="0"/>
+    </mc:Choice>
+    <mc:Fallback>
+      <p:transition/>
+    </mc:Fallback>
+  </mc:AlternateContent>
 </p:sld>
 </file>
 
@@ -11745,6 +11929,216 @@
       </p:par>
     </p:tnLst>
   </p:timing>
+</p:sld>
+</file>
+
+<file path=ppt/slides/slide20.xml><?xml version="1.0" encoding="utf-8"?>
+<p:sld xmlns:a="http://schemas.openxmlformats.org/drawingml/2006/main" xmlns:r="http://schemas.openxmlformats.org/officeDocument/2006/relationships" xmlns:p="http://schemas.openxmlformats.org/presentationml/2006/main">
+  <p:cSld>
+    <p:spTree>
+      <p:nvGrpSpPr>
+        <p:cNvPr id="1" name=""/>
+        <p:cNvGrpSpPr/>
+        <p:nvPr/>
+      </p:nvGrpSpPr>
+      <p:grpSpPr>
+        <a:xfrm>
+          <a:off x="0" y="0"/>
+          <a:ext cx="0" cy="0"/>
+          <a:chOff x="0" y="0"/>
+          <a:chExt cx="0" cy="0"/>
+        </a:xfrm>
+      </p:grpSpPr>
+      <p:sp>
+        <p:nvSpPr>
+          <p:cNvPr id="3" name="Rectangle 2"/>
+          <p:cNvSpPr/>
+          <p:nvPr/>
+        </p:nvSpPr>
+        <p:spPr>
+          <a:xfrm>
+            <a:off x="7455506" y="756102"/>
+            <a:ext cx="10100974" cy="1077176"/>
+          </a:xfrm>
+          <a:prstGeom prst="rect">
+            <a:avLst/>
+          </a:prstGeom>
+          <a:noFill/>
+          <a:ln w="6350" cmpd="sng">
+            <a:noFill/>
+          </a:ln>
+          <a:effectLst/>
+        </p:spPr>
+        <p:style>
+          <a:lnRef idx="1">
+            <a:schemeClr val="accent1"/>
+          </a:lnRef>
+          <a:fillRef idx="3">
+            <a:schemeClr val="accent1"/>
+          </a:fillRef>
+          <a:effectRef idx="2">
+            <a:schemeClr val="accent1"/>
+          </a:effectRef>
+          <a:fontRef idx="minor">
+            <a:schemeClr val="lt1"/>
+          </a:fontRef>
+        </p:style>
+        <p:txBody>
+          <a:bodyPr wrap="square" lIns="243797" tIns="121899" rIns="243797" bIns="121899" rtlCol="0" anchor="ctr">
+            <a:spAutoFit/>
+          </a:bodyPr>
+          <a:lstStyle/>
+          <a:p>
+            <a:pPr algn="ctr">
+              <a:tabLst>
+                <a:tab pos="338138" algn="l"/>
+              </a:tabLst>
+            </a:pPr>
+            <a:r>
+              <a:rPr lang="en-US" sz="5400" dirty="0" smtClean="0">
+                <a:solidFill>
+                  <a:schemeClr val="tx1"/>
+                </a:solidFill>
+                <a:cs typeface="Lato Light"/>
+              </a:rPr>
+              <a:t>Android</a:t>
+            </a:r>
+            <a:endParaRPr lang="en-US" sz="5400" dirty="0" smtClean="0">
+              <a:solidFill>
+                <a:schemeClr val="tx1"/>
+              </a:solidFill>
+              <a:latin typeface="Lato Light"/>
+              <a:cs typeface="Lato Light"/>
+            </a:endParaRPr>
+          </a:p>
+        </p:txBody>
+      </p:sp>
+      <p:sp>
+        <p:nvSpPr>
+          <p:cNvPr id="5" name="Rectangle 4"/>
+          <p:cNvSpPr/>
+          <p:nvPr/>
+        </p:nvSpPr>
+        <p:spPr>
+          <a:xfrm>
+            <a:off x="3762103" y="3004457"/>
+            <a:ext cx="19359155" cy="6740307"/>
+          </a:xfrm>
+          <a:prstGeom prst="rect">
+            <a:avLst/>
+          </a:prstGeom>
+        </p:spPr>
+        <p:txBody>
+          <a:bodyPr wrap="square">
+            <a:spAutoFit/>
+          </a:bodyPr>
+          <a:lstStyle/>
+          <a:p>
+            <a:r>
+              <a:rPr lang="en-US" dirty="0"/>
+              <a:t>Android use Java and HTML to develop mobile application</a:t>
+            </a:r>
+          </a:p>
+          <a:p>
+            <a:r>
+              <a:rPr lang="en-US" dirty="0"/>
+              <a:t>Summary:</a:t>
+            </a:r>
+          </a:p>
+          <a:p>
+            <a:pPr lvl="0"/>
+            <a:r>
+              <a:rPr lang="en-US" dirty="0"/>
+              <a:t>Naming convention:</a:t>
+            </a:r>
+          </a:p>
+          <a:p>
+            <a:pPr lvl="1"/>
+            <a:r>
+              <a:rPr lang="en-US" dirty="0"/>
+              <a:t>Follow basic principle of &lt;WHAT&gt;_&lt;WHERE&gt;_&lt;DESCRIPTION&gt;_&lt;SIZE&gt; for resource names</a:t>
+            </a:r>
+          </a:p>
+          <a:p>
+            <a:pPr lvl="1"/>
+            <a:r>
+              <a:rPr lang="en-US" dirty="0"/>
+              <a:t>Follow basic principle of &lt;WHAT&gt;_&lt;WHERE&gt;.XML for layout</a:t>
+            </a:r>
+          </a:p>
+          <a:p>
+            <a:pPr lvl="1"/>
+            <a:r>
+              <a:rPr lang="en-US" dirty="0"/>
+              <a:t>Follow basic principle of &lt;WHERE&gt;_&lt;DESCRIPTION&gt; for string resources</a:t>
+            </a:r>
+          </a:p>
+          <a:p>
+            <a:pPr lvl="1"/>
+            <a:r>
+              <a:rPr lang="en-US" dirty="0"/>
+              <a:t>Follow basic principle of &lt;WHERE&gt;_&lt;DESCRIPTION&gt;_&lt;SIZE&gt; for </a:t>
+            </a:r>
+            <a:r>
+              <a:rPr lang="en-US" dirty="0" err="1"/>
+              <a:t>drawable</a:t>
+            </a:r>
+            <a:r>
+              <a:rPr lang="en-US" dirty="0"/>
+              <a:t> resource</a:t>
+            </a:r>
+          </a:p>
+          <a:p>
+            <a:pPr lvl="1"/>
+            <a:r>
+              <a:rPr lang="en-US" dirty="0"/>
+              <a:t>Follow basic principle of &lt;WHAT&gt;_&lt;WHERE&gt;_&lt;DESCRIPTION&gt; for IDs</a:t>
+            </a:r>
+          </a:p>
+          <a:p>
+            <a:r>
+              <a:rPr lang="en-US" dirty="0"/>
+              <a:t>More detail about code conventions for Android by Google and our team:</a:t>
+            </a:r>
+          </a:p>
+          <a:p>
+            <a:r>
+              <a:rPr lang="en-US" u="sng" dirty="0">
+                <a:hlinkClick r:id="rId2"/>
+              </a:rPr>
+              <a:t>https://source.android.com/source/code-style.html</a:t>
+            </a:r>
+            <a:endParaRPr lang="en-US" dirty="0"/>
+          </a:p>
+          <a:p>
+            <a:r>
+              <a:rPr lang="en-US" u="sng" dirty="0">
+                <a:hlinkClick r:id="rId3"/>
+              </a:rPr>
+              <a:t>https://github.com/Hinaka/-FPT-CAPSTONE-PGSS/tree/master/Common</a:t>
+            </a:r>
+            <a:endParaRPr lang="en-US" dirty="0"/>
+          </a:p>
+        </p:txBody>
+      </p:sp>
+    </p:spTree>
+    <p:extLst>
+      <p:ext uri="{BB962C8B-B14F-4D97-AF65-F5344CB8AC3E}">
+        <p14:creationId xmlns:p14="http://schemas.microsoft.com/office/powerpoint/2010/main" val="97824096"/>
+      </p:ext>
+    </p:extLst>
+  </p:cSld>
+  <p:clrMapOvr>
+    <a:masterClrMapping/>
+  </p:clrMapOvr>
+  <mc:AlternateContent xmlns:mc="http://schemas.openxmlformats.org/markup-compatibility/2006">
+    <mc:Choice xmlns:p14="http://schemas.microsoft.com/office/powerpoint/2010/main" Requires="p14">
+      <p:transition p14:dur="0"/>
+    </mc:Choice>
+    <mc:Fallback>
+      <p:transition/>
+    </mc:Fallback>
+  </mc:AlternateContent>
 </p:sld>
 </file>
 
@@ -20447,11 +20841,11 @@
   <p:clrMapOvr>
     <a:masterClrMapping/>
   </p:clrMapOvr>
-  <mc:AlternateContent xmlns:mc="http://schemas.openxmlformats.org/markup-compatibility/2006">
-    <mc:Choice xmlns:p14="http://schemas.microsoft.com/office/powerpoint/2010/main" Requires="p14">
+  <mc:AlternateContent xmlns:mc="http://schemas.openxmlformats.org/markup-compatibility/2006" xmlns:p14="http://schemas.microsoft.com/office/powerpoint/2010/main">
+    <mc:Choice Requires="p14">
       <p:transition p14:dur="0"/>
     </mc:Choice>
-    <mc:Fallback>
+    <mc:Fallback xmlns="">
       <p:transition/>
     </mc:Fallback>
   </mc:AlternateContent>
@@ -21725,11 +22119,11 @@
   <p:clrMapOvr>
     <a:masterClrMapping/>
   </p:clrMapOvr>
-  <mc:AlternateContent xmlns:mc="http://schemas.openxmlformats.org/markup-compatibility/2006">
-    <mc:Choice xmlns:p14="http://schemas.microsoft.com/office/powerpoint/2010/main" Requires="p14">
+  <mc:AlternateContent xmlns:mc="http://schemas.openxmlformats.org/markup-compatibility/2006" xmlns:p14="http://schemas.microsoft.com/office/powerpoint/2010/main">
+    <mc:Choice Requires="p14">
       <p:transition p14:dur="0"/>
     </mc:Choice>
-    <mc:Fallback>
+    <mc:Fallback xmlns="">
       <p:transition/>
     </mc:Fallback>
   </mc:AlternateContent>
@@ -22139,11 +22533,11 @@
   <p:clrMapOvr>
     <a:masterClrMapping/>
   </p:clrMapOvr>
-  <mc:AlternateContent xmlns:mc="http://schemas.openxmlformats.org/markup-compatibility/2006">
-    <mc:Choice xmlns:p14="http://schemas.microsoft.com/office/powerpoint/2010/main" Requires="p14">
+  <mc:AlternateContent xmlns:mc="http://schemas.openxmlformats.org/markup-compatibility/2006" xmlns:p14="http://schemas.microsoft.com/office/powerpoint/2010/main">
+    <mc:Choice Requires="p14">
       <p:transition p14:dur="0"/>
     </mc:Choice>
-    <mc:Fallback>
+    <mc:Fallback xmlns="">
       <p:transition/>
     </mc:Fallback>
   </mc:AlternateContent>
@@ -22272,11 +22666,11 @@
   <p:clrMapOvr>
     <a:masterClrMapping/>
   </p:clrMapOvr>
-  <mc:AlternateContent xmlns:mc="http://schemas.openxmlformats.org/markup-compatibility/2006">
-    <mc:Choice xmlns:p14="http://schemas.microsoft.com/office/powerpoint/2010/main" Requires="p14">
+  <mc:AlternateContent xmlns:mc="http://schemas.openxmlformats.org/markup-compatibility/2006" xmlns:p14="http://schemas.microsoft.com/office/powerpoint/2010/main">
+    <mc:Choice Requires="p14">
       <p:transition p14:dur="0"/>
     </mc:Choice>
-    <mc:Fallback>
+    <mc:Fallback xmlns="">
       <p:transition/>
     </mc:Fallback>
   </mc:AlternateContent>

</xml_diff>